<commit_message>
Make README, example `index.html` and PDF
</commit_message>
<xml_diff>
--- a/presentation/Web Components SthlmJS.pptx
+++ b/presentation/Web Components SthlmJS.pptx
@@ -5049,12 +5049,8 @@
               <a:t>sthlm.js </a:t>
             </a:r>
             <a:r>
-              <a:rPr lang="en-US"/>
-              <a:t>Nov 27, </a:t>
-            </a:r>
-            <a:r>
               <a:rPr lang="en-US" dirty="0"/>
-              <a:t>2019</a:t>
+              <a:t>Nov 27, 2019</a:t>
             </a:r>
           </a:p>
         </p:txBody>

</xml_diff>